<commit_message>
Inclución de CAD de esta implementación
</commit_message>
<xml_diff>
--- a/docs/Pinouts.pptx
+++ b/docs/Pinouts.pptx
@@ -7,6 +7,7 @@
   <p:sldIdLst>
     <p:sldId id="256" r:id="rId2"/>
     <p:sldId id="257" r:id="rId3"/>
+    <p:sldId id="258" r:id="rId4"/>
   </p:sldIdLst>
   <p:sldSz cx="12192000" cy="6858000"/>
   <p:notesSz cx="6858000" cy="9144000"/>
@@ -783,7 +784,7 @@
           <a:p>
             <a:fld id="{05090C6F-CBE3-457E-9751-8FDFDA047CE3}" type="datetimeFigureOut">
               <a:rPr lang="en-US" smtClean="0"/>
-              <a:t>9/18/2025</a:t>
+              <a:t>11/8/2025</a:t>
             </a:fld>
             <a:endParaRPr lang="en-US"/>
           </a:p>
@@ -981,7 +982,7 @@
           <a:p>
             <a:fld id="{05090C6F-CBE3-457E-9751-8FDFDA047CE3}" type="datetimeFigureOut">
               <a:rPr lang="en-US" smtClean="0"/>
-              <a:t>9/18/2025</a:t>
+              <a:t>11/8/2025</a:t>
             </a:fld>
             <a:endParaRPr lang="en-US"/>
           </a:p>
@@ -1189,7 +1190,7 @@
           <a:p>
             <a:fld id="{05090C6F-CBE3-457E-9751-8FDFDA047CE3}" type="datetimeFigureOut">
               <a:rPr lang="en-US" smtClean="0"/>
-              <a:t>9/18/2025</a:t>
+              <a:t>11/8/2025</a:t>
             </a:fld>
             <a:endParaRPr lang="en-US"/>
           </a:p>
@@ -1387,7 +1388,7 @@
           <a:p>
             <a:fld id="{05090C6F-CBE3-457E-9751-8FDFDA047CE3}" type="datetimeFigureOut">
               <a:rPr lang="en-US" smtClean="0"/>
-              <a:t>9/18/2025</a:t>
+              <a:t>11/8/2025</a:t>
             </a:fld>
             <a:endParaRPr lang="en-US"/>
           </a:p>
@@ -1662,7 +1663,7 @@
           <a:p>
             <a:fld id="{05090C6F-CBE3-457E-9751-8FDFDA047CE3}" type="datetimeFigureOut">
               <a:rPr lang="en-US" smtClean="0"/>
-              <a:t>9/18/2025</a:t>
+              <a:t>11/8/2025</a:t>
             </a:fld>
             <a:endParaRPr lang="en-US"/>
           </a:p>
@@ -1927,7 +1928,7 @@
           <a:p>
             <a:fld id="{05090C6F-CBE3-457E-9751-8FDFDA047CE3}" type="datetimeFigureOut">
               <a:rPr lang="en-US" smtClean="0"/>
-              <a:t>9/18/2025</a:t>
+              <a:t>11/8/2025</a:t>
             </a:fld>
             <a:endParaRPr lang="en-US"/>
           </a:p>
@@ -2339,7 +2340,7 @@
           <a:p>
             <a:fld id="{05090C6F-CBE3-457E-9751-8FDFDA047CE3}" type="datetimeFigureOut">
               <a:rPr lang="en-US" smtClean="0"/>
-              <a:t>9/18/2025</a:t>
+              <a:t>11/8/2025</a:t>
             </a:fld>
             <a:endParaRPr lang="en-US"/>
           </a:p>
@@ -2480,7 +2481,7 @@
           <a:p>
             <a:fld id="{05090C6F-CBE3-457E-9751-8FDFDA047CE3}" type="datetimeFigureOut">
               <a:rPr lang="en-US" smtClean="0"/>
-              <a:t>9/18/2025</a:t>
+              <a:t>11/8/2025</a:t>
             </a:fld>
             <a:endParaRPr lang="en-US"/>
           </a:p>
@@ -2593,7 +2594,7 @@
           <a:p>
             <a:fld id="{05090C6F-CBE3-457E-9751-8FDFDA047CE3}" type="datetimeFigureOut">
               <a:rPr lang="en-US" smtClean="0"/>
-              <a:t>9/18/2025</a:t>
+              <a:t>11/8/2025</a:t>
             </a:fld>
             <a:endParaRPr lang="en-US"/>
           </a:p>
@@ -2904,7 +2905,7 @@
           <a:p>
             <a:fld id="{05090C6F-CBE3-457E-9751-8FDFDA047CE3}" type="datetimeFigureOut">
               <a:rPr lang="en-US" smtClean="0"/>
-              <a:t>9/18/2025</a:t>
+              <a:t>11/8/2025</a:t>
             </a:fld>
             <a:endParaRPr lang="en-US"/>
           </a:p>
@@ -3192,7 +3193,7 @@
           <a:p>
             <a:fld id="{05090C6F-CBE3-457E-9751-8FDFDA047CE3}" type="datetimeFigureOut">
               <a:rPr lang="en-US" smtClean="0"/>
-              <a:t>9/18/2025</a:t>
+              <a:t>11/8/2025</a:t>
             </a:fld>
             <a:endParaRPr lang="en-US"/>
           </a:p>
@@ -3433,7 +3434,7 @@
           <a:p>
             <a:fld id="{05090C6F-CBE3-457E-9751-8FDFDA047CE3}" type="datetimeFigureOut">
               <a:rPr lang="en-US" smtClean="0"/>
-              <a:t>9/18/2025</a:t>
+              <a:t>11/8/2025</a:t>
             </a:fld>
             <a:endParaRPr lang="en-US"/>
           </a:p>
@@ -4250,8 +4251,8 @@
           </a:p>
         </p:txBody>
       </p:sp>
-      <mc:AlternateContent xmlns:mc="http://schemas.openxmlformats.org/markup-compatibility/2006">
-        <mc:Choice xmlns:p14="http://schemas.microsoft.com/office/powerpoint/2010/main" Requires="p14">
+      <mc:AlternateContent xmlns:mc="http://schemas.openxmlformats.org/markup-compatibility/2006" xmlns:p14="http://schemas.microsoft.com/office/powerpoint/2010/main">
+        <mc:Choice Requires="p14">
           <p:contentPart p14:bwMode="auto" r:id="rId8">
             <p14:nvContentPartPr>
               <p14:cNvPr id="51" name="Ink 50">
@@ -4270,7 +4271,7 @@
             </p14:xfrm>
           </p:contentPart>
         </mc:Choice>
-        <mc:Fallback>
+        <mc:Fallback xmlns="">
           <p:pic>
             <p:nvPicPr>
               <p:cNvPr id="51" name="Ink 50">
@@ -4731,8 +4732,8 @@
           </a:p>
         </p:txBody>
       </p:sp>
-      <mc:AlternateContent xmlns:mc="http://schemas.openxmlformats.org/markup-compatibility/2006">
-        <mc:Choice xmlns:p14="http://schemas.microsoft.com/office/powerpoint/2010/main" Requires="p14">
+      <mc:AlternateContent xmlns:mc="http://schemas.openxmlformats.org/markup-compatibility/2006" xmlns:p14="http://schemas.microsoft.com/office/powerpoint/2010/main">
+        <mc:Choice Requires="p14">
           <p:contentPart p14:bwMode="auto" r:id="rId20">
             <p14:nvContentPartPr>
               <p14:cNvPr id="4" name="Entrada de lápiz 3">
@@ -4751,7 +4752,7 @@
             </p14:xfrm>
           </p:contentPart>
         </mc:Choice>
-        <mc:Fallback>
+        <mc:Fallback xmlns="">
           <p:pic>
             <p:nvPicPr>
               <p:cNvPr id="4" name="Entrada de lápiz 3">
@@ -4782,8 +4783,8 @@
           </p:pic>
         </mc:Fallback>
       </mc:AlternateContent>
-      <mc:AlternateContent xmlns:mc="http://schemas.openxmlformats.org/markup-compatibility/2006">
-        <mc:Choice xmlns:p14="http://schemas.microsoft.com/office/powerpoint/2010/main" Requires="p14">
+      <mc:AlternateContent xmlns:mc="http://schemas.openxmlformats.org/markup-compatibility/2006" xmlns:p14="http://schemas.microsoft.com/office/powerpoint/2010/main">
+        <mc:Choice Requires="p14">
           <p:contentPart p14:bwMode="auto" r:id="rId22">
             <p14:nvContentPartPr>
               <p14:cNvPr id="5" name="Entrada de lápiz 4">
@@ -4802,7 +4803,7 @@
             </p14:xfrm>
           </p:contentPart>
         </mc:Choice>
-        <mc:Fallback>
+        <mc:Fallback xmlns="">
           <p:pic>
             <p:nvPicPr>
               <p:cNvPr id="5" name="Entrada de lápiz 4">
@@ -4833,8 +4834,8 @@
           </p:pic>
         </mc:Fallback>
       </mc:AlternateContent>
-      <mc:AlternateContent xmlns:mc="http://schemas.openxmlformats.org/markup-compatibility/2006">
-        <mc:Choice xmlns:p14="http://schemas.microsoft.com/office/powerpoint/2010/main" Requires="p14">
+      <mc:AlternateContent xmlns:mc="http://schemas.openxmlformats.org/markup-compatibility/2006" xmlns:p14="http://schemas.microsoft.com/office/powerpoint/2010/main">
+        <mc:Choice Requires="p14">
           <p:contentPart p14:bwMode="auto" r:id="rId24">
             <p14:nvContentPartPr>
               <p14:cNvPr id="9" name="Entrada de lápiz 8">
@@ -4853,7 +4854,7 @@
             </p14:xfrm>
           </p:contentPart>
         </mc:Choice>
-        <mc:Fallback>
+        <mc:Fallback xmlns="">
           <p:pic>
             <p:nvPicPr>
               <p:cNvPr id="9" name="Entrada de lápiz 8">
@@ -4884,8 +4885,8 @@
           </p:pic>
         </mc:Fallback>
       </mc:AlternateContent>
-      <mc:AlternateContent xmlns:mc="http://schemas.openxmlformats.org/markup-compatibility/2006">
-        <mc:Choice xmlns:p14="http://schemas.microsoft.com/office/powerpoint/2010/main" Requires="p14">
+      <mc:AlternateContent xmlns:mc="http://schemas.openxmlformats.org/markup-compatibility/2006" xmlns:p14="http://schemas.microsoft.com/office/powerpoint/2010/main">
+        <mc:Choice Requires="p14">
           <p:contentPart p14:bwMode="auto" r:id="rId26">
             <p14:nvContentPartPr>
               <p14:cNvPr id="10" name="Entrada de lápiz 9">
@@ -4904,7 +4905,7 @@
             </p14:xfrm>
           </p:contentPart>
         </mc:Choice>
-        <mc:Fallback>
+        <mc:Fallback xmlns="">
           <p:pic>
             <p:nvPicPr>
               <p:cNvPr id="10" name="Entrada de lápiz 9">
@@ -4955,8 +4956,8 @@
             <a:chExt cx="2506680" cy="2136240"/>
           </a:xfrm>
         </p:grpSpPr>
-        <mc:AlternateContent xmlns:mc="http://schemas.openxmlformats.org/markup-compatibility/2006">
-          <mc:Choice xmlns:p14="http://schemas.microsoft.com/office/powerpoint/2010/main" Requires="p14">
+        <mc:AlternateContent xmlns:mc="http://schemas.openxmlformats.org/markup-compatibility/2006" xmlns:p14="http://schemas.microsoft.com/office/powerpoint/2010/main">
+          <mc:Choice Requires="p14">
             <p:contentPart p14:bwMode="auto" r:id="rId28">
               <p14:nvContentPartPr>
                 <p14:cNvPr id="11" name="Entrada de lápiz 10">
@@ -4975,7 +4976,7 @@
               </p14:xfrm>
             </p:contentPart>
           </mc:Choice>
-          <mc:Fallback>
+          <mc:Fallback xmlns="">
             <p:pic>
               <p:nvPicPr>
                 <p:cNvPr id="11" name="Entrada de lápiz 10">
@@ -5006,8 +5007,8 @@
             </p:pic>
           </mc:Fallback>
         </mc:AlternateContent>
-        <mc:AlternateContent xmlns:mc="http://schemas.openxmlformats.org/markup-compatibility/2006">
-          <mc:Choice xmlns:p14="http://schemas.microsoft.com/office/powerpoint/2010/main" Requires="p14">
+        <mc:AlternateContent xmlns:mc="http://schemas.openxmlformats.org/markup-compatibility/2006" xmlns:p14="http://schemas.microsoft.com/office/powerpoint/2010/main">
+          <mc:Choice Requires="p14">
             <p:contentPart p14:bwMode="auto" r:id="rId30">
               <p14:nvContentPartPr>
                 <p14:cNvPr id="12" name="Entrada de lápiz 11">
@@ -5026,7 +5027,7 @@
               </p14:xfrm>
             </p:contentPart>
           </mc:Choice>
-          <mc:Fallback>
+          <mc:Fallback xmlns="">
             <p:pic>
               <p:nvPicPr>
                 <p:cNvPr id="12" name="Entrada de lápiz 11">
@@ -5078,8 +5079,8 @@
             <a:chExt cx="2111400" cy="2837520"/>
           </a:xfrm>
         </p:grpSpPr>
-        <mc:AlternateContent xmlns:mc="http://schemas.openxmlformats.org/markup-compatibility/2006">
-          <mc:Choice xmlns:p14="http://schemas.microsoft.com/office/powerpoint/2010/main" Requires="p14">
+        <mc:AlternateContent xmlns:mc="http://schemas.openxmlformats.org/markup-compatibility/2006" xmlns:p14="http://schemas.microsoft.com/office/powerpoint/2010/main">
+          <mc:Choice Requires="p14">
             <p:contentPart p14:bwMode="auto" r:id="rId32">
               <p14:nvContentPartPr>
                 <p14:cNvPr id="18" name="Entrada de lápiz 17">
@@ -5098,7 +5099,7 @@
               </p14:xfrm>
             </p:contentPart>
           </mc:Choice>
-          <mc:Fallback>
+          <mc:Fallback xmlns="">
             <p:pic>
               <p:nvPicPr>
                 <p:cNvPr id="18" name="Entrada de lápiz 17">
@@ -5129,8 +5130,8 @@
             </p:pic>
           </mc:Fallback>
         </mc:AlternateContent>
-        <mc:AlternateContent xmlns:mc="http://schemas.openxmlformats.org/markup-compatibility/2006">
-          <mc:Choice xmlns:p14="http://schemas.microsoft.com/office/powerpoint/2010/main" Requires="p14">
+        <mc:AlternateContent xmlns:mc="http://schemas.openxmlformats.org/markup-compatibility/2006" xmlns:p14="http://schemas.microsoft.com/office/powerpoint/2010/main">
+          <mc:Choice Requires="p14">
             <p:contentPart p14:bwMode="auto" r:id="rId34">
               <p14:nvContentPartPr>
                 <p14:cNvPr id="19" name="Entrada de lápiz 18">
@@ -5149,7 +5150,7 @@
               </p14:xfrm>
             </p:contentPart>
           </mc:Choice>
-          <mc:Fallback>
+          <mc:Fallback xmlns="">
             <p:pic>
               <p:nvPicPr>
                 <p:cNvPr id="19" name="Entrada de lápiz 18">
@@ -5640,8 +5641,8 @@
             <a:chExt cx="2022480" cy="3501720"/>
           </a:xfrm>
         </p:grpSpPr>
-        <mc:AlternateContent xmlns:mc="http://schemas.openxmlformats.org/markup-compatibility/2006">
-          <mc:Choice xmlns:p14="http://schemas.microsoft.com/office/powerpoint/2010/main" Requires="p14">
+        <mc:AlternateContent xmlns:mc="http://schemas.openxmlformats.org/markup-compatibility/2006" xmlns:p14="http://schemas.microsoft.com/office/powerpoint/2010/main">
+          <mc:Choice Requires="p14">
             <p:contentPart p14:bwMode="auto" r:id="rId5">
               <p14:nvContentPartPr>
                 <p14:cNvPr id="27" name="Entrada de lápiz 26">
@@ -5660,7 +5661,7 @@
               </p14:xfrm>
             </p:contentPart>
           </mc:Choice>
-          <mc:Fallback>
+          <mc:Fallback xmlns="">
             <p:pic>
               <p:nvPicPr>
                 <p:cNvPr id="27" name="Entrada de lápiz 26">
@@ -5691,8 +5692,8 @@
             </p:pic>
           </mc:Fallback>
         </mc:AlternateContent>
-        <mc:AlternateContent xmlns:mc="http://schemas.openxmlformats.org/markup-compatibility/2006">
-          <mc:Choice xmlns:p14="http://schemas.microsoft.com/office/powerpoint/2010/main" Requires="p14">
+        <mc:AlternateContent xmlns:mc="http://schemas.openxmlformats.org/markup-compatibility/2006" xmlns:p14="http://schemas.microsoft.com/office/powerpoint/2010/main">
+          <mc:Choice Requires="p14">
             <p:contentPart p14:bwMode="auto" r:id="rId7">
               <p14:nvContentPartPr>
                 <p14:cNvPr id="28" name="Entrada de lápiz 27">
@@ -5711,7 +5712,7 @@
               </p14:xfrm>
             </p:contentPart>
           </mc:Choice>
-          <mc:Fallback>
+          <mc:Fallback xmlns="">
             <p:pic>
               <p:nvPicPr>
                 <p:cNvPr id="28" name="Entrada de lápiz 27">
@@ -5743,8 +5744,8 @@
           </mc:Fallback>
         </mc:AlternateContent>
       </p:grpSp>
-      <mc:AlternateContent xmlns:mc="http://schemas.openxmlformats.org/markup-compatibility/2006">
-        <mc:Choice xmlns:p14="http://schemas.microsoft.com/office/powerpoint/2010/main" Requires="p14">
+      <mc:AlternateContent xmlns:mc="http://schemas.openxmlformats.org/markup-compatibility/2006" xmlns:p14="http://schemas.microsoft.com/office/powerpoint/2010/main">
+        <mc:Choice Requires="p14">
           <p:contentPart p14:bwMode="auto" r:id="rId9">
             <p14:nvContentPartPr>
               <p14:cNvPr id="30" name="Entrada de lápiz 29">
@@ -5763,7 +5764,7 @@
             </p14:xfrm>
           </p:contentPart>
         </mc:Choice>
-        <mc:Fallback>
+        <mc:Fallback xmlns="">
           <p:pic>
             <p:nvPicPr>
               <p:cNvPr id="30" name="Entrada de lápiz 29">
@@ -6145,6 +6146,76 @@
     <p:extLst>
       <p:ext uri="{BB962C8B-B14F-4D97-AF65-F5344CB8AC3E}">
         <p14:creationId xmlns:p14="http://schemas.microsoft.com/office/powerpoint/2010/main" val="142551567"/>
+      </p:ext>
+    </p:extLst>
+  </p:cSld>
+  <p:clrMapOvr>
+    <a:masterClrMapping/>
+  </p:clrMapOvr>
+</p:sld>
+</file>
+
+<file path=ppt/slides/slide3.xml><?xml version="1.0" encoding="utf-8"?>
+<p:sld xmlns:a="http://schemas.openxmlformats.org/drawingml/2006/main" xmlns:r="http://schemas.openxmlformats.org/officeDocument/2006/relationships" xmlns:p="http://schemas.openxmlformats.org/presentationml/2006/main">
+  <p:cSld>
+    <p:spTree>
+      <p:nvGrpSpPr>
+        <p:cNvPr id="1" name=""/>
+        <p:cNvGrpSpPr/>
+        <p:nvPr/>
+      </p:nvGrpSpPr>
+      <p:grpSpPr>
+        <a:xfrm>
+          <a:off x="0" y="0"/>
+          <a:ext cx="0" cy="0"/>
+          <a:chOff x="0" y="0"/>
+          <a:chExt cx="0" cy="0"/>
+        </a:xfrm>
+      </p:grpSpPr>
+      <p:sp>
+        <p:nvSpPr>
+          <p:cNvPr id="2" name="CuadroTexto 1">
+            <a:extLst>
+              <a:ext uri="{FF2B5EF4-FFF2-40B4-BE49-F238E27FC236}">
+                <a16:creationId xmlns:a16="http://schemas.microsoft.com/office/drawing/2014/main" id="{87CC1C00-EBAA-C7A2-BA67-F100C42194D5}"/>
+              </a:ext>
+            </a:extLst>
+          </p:cNvPr>
+          <p:cNvSpPr txBox="1"/>
+          <p:nvPr/>
+        </p:nvSpPr>
+        <p:spPr>
+          <a:xfrm>
+            <a:off x="4575175" y="2551837"/>
+            <a:ext cx="3041650" cy="1754326"/>
+          </a:xfrm>
+          <a:prstGeom prst="rect">
+            <a:avLst/>
+          </a:prstGeom>
+          <a:noFill/>
+        </p:spPr>
+        <p:txBody>
+          <a:bodyPr wrap="square" rtlCol="0">
+            <a:spAutoFit/>
+          </a:bodyPr>
+          <a:lstStyle/>
+          <a:p>
+            <a:pPr algn="ctr"/>
+            <a:r>
+              <a:rPr lang="es-MX" sz="3600" dirty="0">
+                <a:solidFill>
+                  <a:srgbClr val="FF0000"/>
+                </a:solidFill>
+              </a:rPr>
+              <a:t>Diagrama de GPS pendiente</a:t>
+            </a:r>
+          </a:p>
+        </p:txBody>
+      </p:sp>
+    </p:spTree>
+    <p:extLst>
+      <p:ext uri="{BB962C8B-B14F-4D97-AF65-F5344CB8AC3E}">
+        <p14:creationId xmlns:p14="http://schemas.microsoft.com/office/powerpoint/2010/main" val="380538355"/>
       </p:ext>
     </p:extLst>
   </p:cSld>

</xml_diff>